<commit_message>
Added profile building diagram
</commit_message>
<xml_diff>
--- a/docs/Network Anamoly Detection.pptx
+++ b/docs/Network Anamoly Detection.pptx
@@ -480,7 +480,7 @@
           </a:lstStyle>
           <a:p>
             <a:r>
-              <a:rPr lang="en-US" smtClean="0"/>
+              <a:rPr lang="en-US"/>
               <a:t>Click to edit Master title style</a:t>
             </a:r>
             <a:endParaRPr lang="en-US" dirty="0"/>
@@ -599,7 +599,7 @@
           </a:lstStyle>
           <a:p>
             <a:r>
-              <a:rPr lang="en-US" smtClean="0"/>
+              <a:rPr lang="en-US"/>
               <a:t>Click to edit Master subtitle style</a:t>
             </a:r>
             <a:endParaRPr lang="en-US" dirty="0"/>
@@ -623,7 +623,7 @@
           <a:p>
             <a:fld id="{2C6F032D-BA9E-9346-BD51-8BCE30FB162D}" type="datetimeFigureOut">
               <a:rPr lang="en-US" smtClean="0"/>
-              <a:t>4/19/17</a:t>
+              <a:t>4/19/2017</a:t>
             </a:fld>
             <a:endParaRPr lang="en-US"/>
           </a:p>
@@ -728,7 +728,7 @@
           </a:lstStyle>
           <a:p>
             <a:r>
-              <a:rPr lang="en-US" smtClean="0"/>
+              <a:rPr lang="en-US"/>
               <a:t>Click to edit Master title style</a:t>
             </a:r>
             <a:endParaRPr lang="en-US" dirty="0"/>
@@ -823,7 +823,7 @@
           </a:lstStyle>
           <a:p>
             <a:r>
-              <a:rPr lang="en-US" smtClean="0"/>
+              <a:rPr lang="en-US"/>
               <a:t>Drag picture to placeholder or click icon to add</a:t>
             </a:r>
             <a:endParaRPr lang="en-US" dirty="0"/>
@@ -891,7 +891,7 @@
           <a:p>
             <a:pPr lvl="0"/>
             <a:r>
-              <a:rPr lang="en-US" smtClean="0"/>
+              <a:rPr lang="en-US"/>
               <a:t>Click to edit Master text styles</a:t>
             </a:r>
           </a:p>
@@ -914,7 +914,7 @@
           <a:p>
             <a:fld id="{2C6F032D-BA9E-9346-BD51-8BCE30FB162D}" type="datetimeFigureOut">
               <a:rPr lang="en-US" smtClean="0"/>
-              <a:t>4/19/17</a:t>
+              <a:t>4/19/2017</a:t>
             </a:fld>
             <a:endParaRPr lang="en-US"/>
           </a:p>
@@ -1014,7 +1014,7 @@
           </a:lstStyle>
           <a:p>
             <a:r>
-              <a:rPr lang="en-US" smtClean="0"/>
+              <a:rPr lang="en-US"/>
               <a:t>Click to edit Master title style</a:t>
             </a:r>
             <a:endParaRPr lang="en-US" dirty="0"/>
@@ -1134,7 +1134,7 @@
           <a:p>
             <a:pPr lvl="0"/>
             <a:r>
-              <a:rPr lang="en-US" smtClean="0"/>
+              <a:rPr lang="en-US"/>
               <a:t>Click to edit Master text styles</a:t>
             </a:r>
           </a:p>
@@ -1157,7 +1157,7 @@
           <a:p>
             <a:fld id="{2C6F032D-BA9E-9346-BD51-8BCE30FB162D}" type="datetimeFigureOut">
               <a:rPr lang="en-US" smtClean="0"/>
-              <a:t>4/19/17</a:t>
+              <a:t>4/19/2017</a:t>
             </a:fld>
             <a:endParaRPr lang="en-US"/>
           </a:p>
@@ -1493,7 +1493,7 @@
           </a:lstStyle>
           <a:p>
             <a:r>
-              <a:rPr lang="en-US" smtClean="0"/>
+              <a:rPr lang="en-US"/>
               <a:t>Click to edit Master title style</a:t>
             </a:r>
             <a:endParaRPr lang="en-US" dirty="0"/>
@@ -1550,7 +1550,7 @@
           <a:p>
             <a:pPr lvl="0"/>
             <a:r>
-              <a:rPr lang="en-US" smtClean="0"/>
+              <a:rPr lang="en-US"/>
               <a:t>Click to edit Master text styles</a:t>
             </a:r>
           </a:p>
@@ -1669,7 +1669,7 @@
           <a:p>
             <a:pPr lvl="0"/>
             <a:r>
-              <a:rPr lang="en-US" smtClean="0"/>
+              <a:rPr lang="en-US"/>
               <a:t>Click to edit Master text styles</a:t>
             </a:r>
           </a:p>
@@ -1692,7 +1692,7 @@
           <a:p>
             <a:fld id="{2C6F032D-BA9E-9346-BD51-8BCE30FB162D}" type="datetimeFigureOut">
               <a:rPr lang="en-US" smtClean="0"/>
-              <a:t>4/19/17</a:t>
+              <a:t>4/19/2017</a:t>
             </a:fld>
             <a:endParaRPr lang="en-US"/>
           </a:p>
@@ -1792,7 +1792,7 @@
           </a:lstStyle>
           <a:p>
             <a:r>
-              <a:rPr lang="en-US" smtClean="0"/>
+              <a:rPr lang="en-US"/>
               <a:t>Click to edit Master title style</a:t>
             </a:r>
             <a:endParaRPr lang="en-US" dirty="0"/>
@@ -1912,7 +1912,7 @@
           <a:p>
             <a:pPr lvl="0"/>
             <a:r>
-              <a:rPr lang="en-US" smtClean="0"/>
+              <a:rPr lang="en-US"/>
               <a:t>Click to edit Master text styles</a:t>
             </a:r>
           </a:p>
@@ -1935,7 +1935,7 @@
           <a:p>
             <a:fld id="{2C6F032D-BA9E-9346-BD51-8BCE30FB162D}" type="datetimeFigureOut">
               <a:rPr lang="en-US" smtClean="0"/>
-              <a:t>4/19/17</a:t>
+              <a:t>4/19/2017</a:t>
             </a:fld>
             <a:endParaRPr lang="en-US"/>
           </a:p>
@@ -2271,7 +2271,7 @@
           </a:lstStyle>
           <a:p>
             <a:r>
-              <a:rPr lang="en-US" smtClean="0"/>
+              <a:rPr lang="en-US"/>
               <a:t>Click to edit Master title style</a:t>
             </a:r>
             <a:endParaRPr lang="en-US" dirty="0"/>
@@ -2320,7 +2320,7 @@
               <a:buNone/>
             </a:pPr>
             <a:r>
-              <a:rPr lang="en-US" smtClean="0"/>
+              <a:rPr lang="en-US"/>
               <a:t>Click to edit Master text styles</a:t>
             </a:r>
           </a:p>
@@ -2439,7 +2439,7 @@
           <a:p>
             <a:pPr lvl="0"/>
             <a:r>
-              <a:rPr lang="en-US" smtClean="0"/>
+              <a:rPr lang="en-US"/>
               <a:t>Click to edit Master text styles</a:t>
             </a:r>
           </a:p>
@@ -2462,7 +2462,7 @@
           <a:p>
             <a:fld id="{2C6F032D-BA9E-9346-BD51-8BCE30FB162D}" type="datetimeFigureOut">
               <a:rPr lang="en-US" smtClean="0"/>
-              <a:t>4/19/17</a:t>
+              <a:t>4/19/2017</a:t>
             </a:fld>
             <a:endParaRPr lang="en-US"/>
           </a:p>
@@ -2563,7 +2563,7 @@
           <a:p>
             <a:pPr marL="0" lvl="0"/>
             <a:r>
-              <a:rPr lang="en-US" smtClean="0"/>
+              <a:rPr lang="en-US"/>
               <a:t>Click to edit Master title style</a:t>
             </a:r>
             <a:endParaRPr lang="en-US" dirty="0"/>
@@ -2612,7 +2612,7 @@
               <a:buNone/>
             </a:pPr>
             <a:r>
-              <a:rPr lang="en-US" smtClean="0"/>
+              <a:rPr lang="en-US"/>
               <a:t>Click to edit Master text styles</a:t>
             </a:r>
           </a:p>
@@ -2731,7 +2731,7 @@
           <a:p>
             <a:pPr lvl="0"/>
             <a:r>
-              <a:rPr lang="en-US" smtClean="0"/>
+              <a:rPr lang="en-US"/>
               <a:t>Click to edit Master text styles</a:t>
             </a:r>
           </a:p>
@@ -2754,7 +2754,7 @@
           <a:p>
             <a:fld id="{2C6F032D-BA9E-9346-BD51-8BCE30FB162D}" type="datetimeFigureOut">
               <a:rPr lang="en-US" smtClean="0"/>
-              <a:t>4/19/17</a:t>
+              <a:t>4/19/2017</a:t>
             </a:fld>
             <a:endParaRPr lang="en-US"/>
           </a:p>
@@ -2847,7 +2847,7 @@
           </a:lstStyle>
           <a:p>
             <a:r>
-              <a:rPr lang="en-US" smtClean="0"/>
+              <a:rPr lang="en-US"/>
               <a:t>Click to edit Master title style</a:t>
             </a:r>
             <a:endParaRPr lang="en-US" dirty="0"/>
@@ -2871,35 +2871,35 @@
           <a:p>
             <a:pPr lvl="0"/>
             <a:r>
-              <a:rPr lang="en-US" smtClean="0"/>
+              <a:rPr lang="en-US"/>
               <a:t>Click to edit Master text styles</a:t>
             </a:r>
           </a:p>
           <a:p>
             <a:pPr lvl="1"/>
             <a:r>
-              <a:rPr lang="en-US" smtClean="0"/>
+              <a:rPr lang="en-US"/>
               <a:t>Second level</a:t>
             </a:r>
           </a:p>
           <a:p>
             <a:pPr lvl="2"/>
             <a:r>
-              <a:rPr lang="en-US" smtClean="0"/>
+              <a:rPr lang="en-US"/>
               <a:t>Third level</a:t>
             </a:r>
           </a:p>
           <a:p>
             <a:pPr lvl="3"/>
             <a:r>
-              <a:rPr lang="en-US" smtClean="0"/>
+              <a:rPr lang="en-US"/>
               <a:t>Fourth level</a:t>
             </a:r>
           </a:p>
           <a:p>
             <a:pPr lvl="4"/>
             <a:r>
-              <a:rPr lang="en-US" smtClean="0"/>
+              <a:rPr lang="en-US"/>
               <a:t>Fifth level</a:t>
             </a:r>
             <a:endParaRPr lang="en-US" dirty="0"/>
@@ -2923,7 +2923,7 @@
           <a:p>
             <a:fld id="{2C6F032D-BA9E-9346-BD51-8BCE30FB162D}" type="datetimeFigureOut">
               <a:rPr lang="en-US" smtClean="0"/>
-              <a:t>4/19/17</a:t>
+              <a:t>4/19/2017</a:t>
             </a:fld>
             <a:endParaRPr lang="en-US"/>
           </a:p>
@@ -3017,7 +3017,7 @@
           <a:lstStyle/>
           <a:p>
             <a:r>
-              <a:rPr lang="en-US" smtClean="0"/>
+              <a:rPr lang="en-US"/>
               <a:t>Click to edit Master title style</a:t>
             </a:r>
             <a:endParaRPr lang="en-US" dirty="0"/>
@@ -3046,35 +3046,35 @@
           <a:p>
             <a:pPr lvl="0"/>
             <a:r>
-              <a:rPr lang="en-US" smtClean="0"/>
+              <a:rPr lang="en-US"/>
               <a:t>Click to edit Master text styles</a:t>
             </a:r>
           </a:p>
           <a:p>
             <a:pPr lvl="1"/>
             <a:r>
-              <a:rPr lang="en-US" smtClean="0"/>
+              <a:rPr lang="en-US"/>
               <a:t>Second level</a:t>
             </a:r>
           </a:p>
           <a:p>
             <a:pPr lvl="2"/>
             <a:r>
-              <a:rPr lang="en-US" smtClean="0"/>
+              <a:rPr lang="en-US"/>
               <a:t>Third level</a:t>
             </a:r>
           </a:p>
           <a:p>
             <a:pPr lvl="3"/>
             <a:r>
-              <a:rPr lang="en-US" smtClean="0"/>
+              <a:rPr lang="en-US"/>
               <a:t>Fourth level</a:t>
             </a:r>
           </a:p>
           <a:p>
             <a:pPr lvl="4"/>
             <a:r>
-              <a:rPr lang="en-US" smtClean="0"/>
+              <a:rPr lang="en-US"/>
               <a:t>Fifth level</a:t>
             </a:r>
             <a:endParaRPr lang="en-US" dirty="0"/>
@@ -3098,7 +3098,7 @@
           <a:p>
             <a:fld id="{2C6F032D-BA9E-9346-BD51-8BCE30FB162D}" type="datetimeFigureOut">
               <a:rPr lang="en-US" smtClean="0"/>
-              <a:t>4/19/17</a:t>
+              <a:t>4/19/2017</a:t>
             </a:fld>
             <a:endParaRPr lang="en-US"/>
           </a:p>
@@ -3187,7 +3187,7 @@
           <a:lstStyle/>
           <a:p>
             <a:r>
-              <a:rPr lang="en-US" smtClean="0"/>
+              <a:rPr lang="en-US"/>
               <a:t>Click to edit Master title style</a:t>
             </a:r>
             <a:endParaRPr lang="en-US" dirty="0"/>
@@ -3211,35 +3211,35 @@
           <a:p>
             <a:pPr lvl="0"/>
             <a:r>
-              <a:rPr lang="en-US" smtClean="0"/>
+              <a:rPr lang="en-US"/>
               <a:t>Click to edit Master text styles</a:t>
             </a:r>
           </a:p>
           <a:p>
             <a:pPr lvl="1"/>
             <a:r>
-              <a:rPr lang="en-US" smtClean="0"/>
+              <a:rPr lang="en-US"/>
               <a:t>Second level</a:t>
             </a:r>
           </a:p>
           <a:p>
             <a:pPr lvl="2"/>
             <a:r>
-              <a:rPr lang="en-US" smtClean="0"/>
+              <a:rPr lang="en-US"/>
               <a:t>Third level</a:t>
             </a:r>
           </a:p>
           <a:p>
             <a:pPr lvl="3"/>
             <a:r>
-              <a:rPr lang="en-US" smtClean="0"/>
+              <a:rPr lang="en-US"/>
               <a:t>Fourth level</a:t>
             </a:r>
           </a:p>
           <a:p>
             <a:pPr lvl="4"/>
             <a:r>
-              <a:rPr lang="en-US" smtClean="0"/>
+              <a:rPr lang="en-US"/>
               <a:t>Fifth level</a:t>
             </a:r>
             <a:endParaRPr lang="en-US" dirty="0"/>
@@ -3263,7 +3263,7 @@
           <a:p>
             <a:fld id="{2C6F032D-BA9E-9346-BD51-8BCE30FB162D}" type="datetimeFigureOut">
               <a:rPr lang="en-US" smtClean="0"/>
-              <a:t>4/19/17</a:t>
+              <a:t>4/19/2017</a:t>
             </a:fld>
             <a:endParaRPr lang="en-US"/>
           </a:p>
@@ -3366,7 +3366,7 @@
           </a:lstStyle>
           <a:p>
             <a:r>
-              <a:rPr lang="en-US" smtClean="0"/>
+              <a:rPr lang="en-US"/>
               <a:t>Click to edit Master title style</a:t>
             </a:r>
             <a:endParaRPr lang="en-US" dirty="0"/>
@@ -3486,7 +3486,7 @@
           <a:p>
             <a:pPr lvl="0"/>
             <a:r>
-              <a:rPr lang="en-US" smtClean="0"/>
+              <a:rPr lang="en-US"/>
               <a:t>Click to edit Master text styles</a:t>
             </a:r>
           </a:p>
@@ -3509,7 +3509,7 @@
           <a:p>
             <a:fld id="{2C6F032D-BA9E-9346-BD51-8BCE30FB162D}" type="datetimeFigureOut">
               <a:rPr lang="en-US" smtClean="0"/>
-              <a:t>4/19/17</a:t>
+              <a:t>4/19/2017</a:t>
             </a:fld>
             <a:endParaRPr lang="en-US"/>
           </a:p>
@@ -3603,7 +3603,7 @@
           <a:lstStyle/>
           <a:p>
             <a:r>
-              <a:rPr lang="en-US" smtClean="0"/>
+              <a:rPr lang="en-US"/>
               <a:t>Click to edit Master title style</a:t>
             </a:r>
             <a:endParaRPr lang="en-US" dirty="0"/>
@@ -3662,35 +3662,35 @@
           <a:p>
             <a:pPr lvl="0"/>
             <a:r>
-              <a:rPr lang="en-US" smtClean="0"/>
+              <a:rPr lang="en-US"/>
               <a:t>Click to edit Master text styles</a:t>
             </a:r>
           </a:p>
           <a:p>
             <a:pPr lvl="1"/>
             <a:r>
-              <a:rPr lang="en-US" smtClean="0"/>
+              <a:rPr lang="en-US"/>
               <a:t>Second level</a:t>
             </a:r>
           </a:p>
           <a:p>
             <a:pPr lvl="2"/>
             <a:r>
-              <a:rPr lang="en-US" smtClean="0"/>
+              <a:rPr lang="en-US"/>
               <a:t>Third level</a:t>
             </a:r>
           </a:p>
           <a:p>
             <a:pPr lvl="3"/>
             <a:r>
-              <a:rPr lang="en-US" smtClean="0"/>
+              <a:rPr lang="en-US"/>
               <a:t>Fourth level</a:t>
             </a:r>
           </a:p>
           <a:p>
             <a:pPr lvl="4"/>
             <a:r>
-              <a:rPr lang="en-US" smtClean="0"/>
+              <a:rPr lang="en-US"/>
               <a:t>Fifth level</a:t>
             </a:r>
             <a:endParaRPr lang="en-US" dirty="0"/>
@@ -3749,35 +3749,35 @@
           <a:p>
             <a:pPr lvl="0"/>
             <a:r>
-              <a:rPr lang="en-US" smtClean="0"/>
+              <a:rPr lang="en-US"/>
               <a:t>Click to edit Master text styles</a:t>
             </a:r>
           </a:p>
           <a:p>
             <a:pPr lvl="1"/>
             <a:r>
-              <a:rPr lang="en-US" smtClean="0"/>
+              <a:rPr lang="en-US"/>
               <a:t>Second level</a:t>
             </a:r>
           </a:p>
           <a:p>
             <a:pPr lvl="2"/>
             <a:r>
-              <a:rPr lang="en-US" smtClean="0"/>
+              <a:rPr lang="en-US"/>
               <a:t>Third level</a:t>
             </a:r>
           </a:p>
           <a:p>
             <a:pPr lvl="3"/>
             <a:r>
-              <a:rPr lang="en-US" smtClean="0"/>
+              <a:rPr lang="en-US"/>
               <a:t>Fourth level</a:t>
             </a:r>
           </a:p>
           <a:p>
             <a:pPr lvl="4"/>
             <a:r>
-              <a:rPr lang="en-US" smtClean="0"/>
+              <a:rPr lang="en-US"/>
               <a:t>Fifth level</a:t>
             </a:r>
             <a:endParaRPr lang="en-US" dirty="0"/>
@@ -3801,7 +3801,7 @@
           <a:p>
             <a:fld id="{2C6F032D-BA9E-9346-BD51-8BCE30FB162D}" type="datetimeFigureOut">
               <a:rPr lang="en-US" smtClean="0"/>
-              <a:t>4/19/17</a:t>
+              <a:t>4/19/2017</a:t>
             </a:fld>
             <a:endParaRPr lang="en-US"/>
           </a:p>
@@ -3894,7 +3894,7 @@
           </a:lstStyle>
           <a:p>
             <a:r>
-              <a:rPr lang="en-US" smtClean="0"/>
+              <a:rPr lang="en-US"/>
               <a:t>Click to edit Master title style</a:t>
             </a:r>
             <a:endParaRPr lang="en-US" dirty="0"/>
@@ -3968,7 +3968,7 @@
           <a:p>
             <a:pPr lvl="0"/>
             <a:r>
-              <a:rPr lang="en-US" smtClean="0"/>
+              <a:rPr lang="en-US"/>
               <a:t>Click to edit Master text styles</a:t>
             </a:r>
           </a:p>
@@ -4026,35 +4026,35 @@
           <a:p>
             <a:pPr lvl="0"/>
             <a:r>
-              <a:rPr lang="en-US" smtClean="0"/>
+              <a:rPr lang="en-US"/>
               <a:t>Click to edit Master text styles</a:t>
             </a:r>
           </a:p>
           <a:p>
             <a:pPr lvl="1"/>
             <a:r>
-              <a:rPr lang="en-US" smtClean="0"/>
+              <a:rPr lang="en-US"/>
               <a:t>Second level</a:t>
             </a:r>
           </a:p>
           <a:p>
             <a:pPr lvl="2"/>
             <a:r>
-              <a:rPr lang="en-US" smtClean="0"/>
+              <a:rPr lang="en-US"/>
               <a:t>Third level</a:t>
             </a:r>
           </a:p>
           <a:p>
             <a:pPr lvl="3"/>
             <a:r>
-              <a:rPr lang="en-US" smtClean="0"/>
+              <a:rPr lang="en-US"/>
               <a:t>Fourth level</a:t>
             </a:r>
           </a:p>
           <a:p>
             <a:pPr lvl="4"/>
             <a:r>
-              <a:rPr lang="en-US" smtClean="0"/>
+              <a:rPr lang="en-US"/>
               <a:t>Fifth level</a:t>
             </a:r>
             <a:endParaRPr lang="en-US" dirty="0"/>
@@ -4128,7 +4128,7 @@
           <a:p>
             <a:pPr lvl="0"/>
             <a:r>
-              <a:rPr lang="en-US" smtClean="0"/>
+              <a:rPr lang="en-US"/>
               <a:t>Click to edit Master text styles</a:t>
             </a:r>
           </a:p>
@@ -4186,35 +4186,35 @@
           <a:p>
             <a:pPr lvl="0"/>
             <a:r>
-              <a:rPr lang="en-US" smtClean="0"/>
+              <a:rPr lang="en-US"/>
               <a:t>Click to edit Master text styles</a:t>
             </a:r>
           </a:p>
           <a:p>
             <a:pPr lvl="1"/>
             <a:r>
-              <a:rPr lang="en-US" smtClean="0"/>
+              <a:rPr lang="en-US"/>
               <a:t>Second level</a:t>
             </a:r>
           </a:p>
           <a:p>
             <a:pPr lvl="2"/>
             <a:r>
-              <a:rPr lang="en-US" smtClean="0"/>
+              <a:rPr lang="en-US"/>
               <a:t>Third level</a:t>
             </a:r>
           </a:p>
           <a:p>
             <a:pPr lvl="3"/>
             <a:r>
-              <a:rPr lang="en-US" smtClean="0"/>
+              <a:rPr lang="en-US"/>
               <a:t>Fourth level</a:t>
             </a:r>
           </a:p>
           <a:p>
             <a:pPr lvl="4"/>
             <a:r>
-              <a:rPr lang="en-US" smtClean="0"/>
+              <a:rPr lang="en-US"/>
               <a:t>Fifth level</a:t>
             </a:r>
             <a:endParaRPr lang="en-US" dirty="0"/>
@@ -4238,7 +4238,7 @@
           <a:p>
             <a:fld id="{2C6F032D-BA9E-9346-BD51-8BCE30FB162D}" type="datetimeFigureOut">
               <a:rPr lang="en-US" smtClean="0"/>
-              <a:t>4/19/17</a:t>
+              <a:t>4/19/2017</a:t>
             </a:fld>
             <a:endParaRPr lang="en-US"/>
           </a:p>
@@ -4327,7 +4327,7 @@
           <a:lstStyle/>
           <a:p>
             <a:r>
-              <a:rPr lang="en-US" smtClean="0"/>
+              <a:rPr lang="en-US"/>
               <a:t>Click to edit Master title style</a:t>
             </a:r>
             <a:endParaRPr lang="en-US" dirty="0"/>
@@ -4351,7 +4351,7 @@
           <a:p>
             <a:fld id="{2C6F032D-BA9E-9346-BD51-8BCE30FB162D}" type="datetimeFigureOut">
               <a:rPr lang="en-US" smtClean="0"/>
-              <a:t>4/19/17</a:t>
+              <a:t>4/19/2017</a:t>
             </a:fld>
             <a:endParaRPr lang="en-US"/>
           </a:p>
@@ -4441,7 +4441,7 @@
           <a:p>
             <a:fld id="{2C6F032D-BA9E-9346-BD51-8BCE30FB162D}" type="datetimeFigureOut">
               <a:rPr lang="en-US" smtClean="0"/>
-              <a:t>4/19/17</a:t>
+              <a:t>4/19/2017</a:t>
             </a:fld>
             <a:endParaRPr lang="en-US"/>
           </a:p>
@@ -4541,7 +4541,7 @@
           </a:lstStyle>
           <a:p>
             <a:r>
-              <a:rPr lang="en-US" smtClean="0"/>
+              <a:rPr lang="en-US"/>
               <a:t>Click to edit Master title style</a:t>
             </a:r>
             <a:endParaRPr lang="en-US" dirty="0"/>
@@ -4600,35 +4600,35 @@
           <a:p>
             <a:pPr lvl="0"/>
             <a:r>
-              <a:rPr lang="en-US" smtClean="0"/>
+              <a:rPr lang="en-US"/>
               <a:t>Click to edit Master text styles</a:t>
             </a:r>
           </a:p>
           <a:p>
             <a:pPr lvl="1"/>
             <a:r>
-              <a:rPr lang="en-US" smtClean="0"/>
+              <a:rPr lang="en-US"/>
               <a:t>Second level</a:t>
             </a:r>
           </a:p>
           <a:p>
             <a:pPr lvl="2"/>
             <a:r>
-              <a:rPr lang="en-US" smtClean="0"/>
+              <a:rPr lang="en-US"/>
               <a:t>Third level</a:t>
             </a:r>
           </a:p>
           <a:p>
             <a:pPr lvl="3"/>
             <a:r>
-              <a:rPr lang="en-US" smtClean="0"/>
+              <a:rPr lang="en-US"/>
               <a:t>Fourth level</a:t>
             </a:r>
           </a:p>
           <a:p>
             <a:pPr lvl="4"/>
             <a:r>
-              <a:rPr lang="en-US" smtClean="0"/>
+              <a:rPr lang="en-US"/>
               <a:t>Fifth level</a:t>
             </a:r>
             <a:endParaRPr lang="en-US" dirty="0"/>
@@ -4696,7 +4696,7 @@
           <a:p>
             <a:pPr lvl="0"/>
             <a:r>
-              <a:rPr lang="en-US" smtClean="0"/>
+              <a:rPr lang="en-US"/>
               <a:t>Click to edit Master text styles</a:t>
             </a:r>
           </a:p>
@@ -4719,7 +4719,7 @@
           <a:p>
             <a:fld id="{2C6F032D-BA9E-9346-BD51-8BCE30FB162D}" type="datetimeFigureOut">
               <a:rPr lang="en-US" smtClean="0"/>
-              <a:t>4/19/17</a:t>
+              <a:t>4/19/2017</a:t>
             </a:fld>
             <a:endParaRPr lang="en-US"/>
           </a:p>
@@ -4819,7 +4819,7 @@
           </a:lstStyle>
           <a:p>
             <a:r>
-              <a:rPr lang="en-US" smtClean="0"/>
+              <a:rPr lang="en-US"/>
               <a:t>Click to edit Master title style</a:t>
             </a:r>
             <a:endParaRPr lang="en-US" dirty="0"/>
@@ -4914,7 +4914,7 @@
           </a:lstStyle>
           <a:p>
             <a:r>
-              <a:rPr lang="en-US" smtClean="0"/>
+              <a:rPr lang="en-US"/>
               <a:t>Drag picture to placeholder or click icon to add</a:t>
             </a:r>
             <a:endParaRPr lang="en-US" dirty="0"/>
@@ -4982,7 +4982,7 @@
           <a:p>
             <a:pPr lvl="0"/>
             <a:r>
-              <a:rPr lang="en-US" smtClean="0"/>
+              <a:rPr lang="en-US"/>
               <a:t>Click to edit Master text styles</a:t>
             </a:r>
           </a:p>
@@ -5005,7 +5005,7 @@
           <a:p>
             <a:fld id="{2C6F032D-BA9E-9346-BD51-8BCE30FB162D}" type="datetimeFigureOut">
               <a:rPr lang="en-US" smtClean="0"/>
-              <a:t>4/19/17</a:t>
+              <a:t>4/19/2017</a:t>
             </a:fld>
             <a:endParaRPr lang="en-US"/>
           </a:p>
@@ -5426,7 +5426,7 @@
           <a:lstStyle/>
           <a:p>
             <a:r>
-              <a:rPr lang="en-US" smtClean="0"/>
+              <a:rPr lang="en-US"/>
               <a:t>Click to edit Master title style</a:t>
             </a:r>
             <a:endParaRPr lang="en-US" dirty="0"/>
@@ -5460,35 +5460,35 @@
           <a:p>
             <a:pPr lvl="0"/>
             <a:r>
-              <a:rPr lang="en-US" smtClean="0"/>
+              <a:rPr lang="en-US"/>
               <a:t>Click to edit Master text styles</a:t>
             </a:r>
           </a:p>
           <a:p>
             <a:pPr lvl="1"/>
             <a:r>
-              <a:rPr lang="en-US" smtClean="0"/>
+              <a:rPr lang="en-US"/>
               <a:t>Second level</a:t>
             </a:r>
           </a:p>
           <a:p>
             <a:pPr lvl="2"/>
             <a:r>
-              <a:rPr lang="en-US" smtClean="0"/>
+              <a:rPr lang="en-US"/>
               <a:t>Third level</a:t>
             </a:r>
           </a:p>
           <a:p>
             <a:pPr lvl="3"/>
             <a:r>
-              <a:rPr lang="en-US" smtClean="0"/>
+              <a:rPr lang="en-US"/>
               <a:t>Fourth level</a:t>
             </a:r>
           </a:p>
           <a:p>
             <a:pPr lvl="4"/>
             <a:r>
-              <a:rPr lang="en-US" smtClean="0"/>
+              <a:rPr lang="en-US"/>
               <a:t>Fifth level</a:t>
             </a:r>
             <a:endParaRPr lang="en-US" dirty="0"/>
@@ -5530,7 +5530,7 @@
           <a:p>
             <a:fld id="{2C6F032D-BA9E-9346-BD51-8BCE30FB162D}" type="datetimeFigureOut">
               <a:rPr lang="en-US" smtClean="0"/>
-              <a:t>4/19/17</a:t>
+              <a:t>4/19/2017</a:t>
             </a:fld>
             <a:endParaRPr lang="en-US"/>
           </a:p>
@@ -6079,10 +6079,9 @@
           <a:lstStyle/>
           <a:p>
             <a:r>
-              <a:rPr lang="en-US" dirty="0" smtClean="0"/>
+              <a:rPr lang="en-US" dirty="0"/>
               <a:t>Network Anomaly Detection using MapReduce</a:t>
             </a:r>
-            <a:endParaRPr lang="en-US" dirty="0"/>
           </a:p>
         </p:txBody>
       </p:sp>
@@ -6104,12 +6103,12 @@
           <a:lstStyle/>
           <a:p>
             <a:r>
-              <a:rPr lang="en-US" dirty="0" smtClean="0"/>
+              <a:rPr lang="en-US" dirty="0"/>
               <a:t>-</a:t>
             </a:r>
           </a:p>
           <a:p>
-            <a:endParaRPr lang="en-US" dirty="0" smtClean="0"/>
+            <a:endParaRPr lang="en-US" dirty="0"/>
           </a:p>
           <a:p>
             <a:r>
@@ -6119,26 +6118,25 @@
           </a:p>
           <a:p>
             <a:r>
-              <a:rPr lang="en-US" dirty="0" smtClean="0"/>
+              <a:rPr lang="en-US" dirty="0"/>
               <a:t>	</a:t>
             </a:r>
             <a:r>
-              <a:rPr lang="en-US" dirty="0" err="1" smtClean="0"/>
+              <a:rPr lang="en-US" dirty="0" err="1"/>
               <a:t>Mehal</a:t>
             </a:r>
             <a:r>
-              <a:rPr lang="en-US" dirty="0" smtClean="0"/>
+              <a:rPr lang="en-US" dirty="0"/>
               <a:t> </a:t>
             </a:r>
             <a:r>
-              <a:rPr lang="en-US" dirty="0" err="1" smtClean="0"/>
+              <a:rPr lang="en-US" dirty="0" err="1"/>
               <a:t>Chaudhari</a:t>
             </a:r>
             <a:r>
-              <a:rPr lang="en-US" dirty="0" smtClean="0"/>
+              <a:rPr lang="en-US" dirty="0"/>
               <a:t>, Nagaprasad Natarajaurs, Suruchi Singh</a:t>
             </a:r>
-            <a:endParaRPr lang="en-US" dirty="0"/>
           </a:p>
         </p:txBody>
       </p:sp>
@@ -6188,10 +6186,9 @@
           <a:lstStyle/>
           <a:p>
             <a:r>
-              <a:rPr lang="en-US" dirty="0" smtClean="0"/>
+              <a:rPr lang="en-US" dirty="0"/>
               <a:t>Work in progress</a:t>
             </a:r>
-            <a:endParaRPr lang="en-US" dirty="0"/>
           </a:p>
         </p:txBody>
       </p:sp>
@@ -6212,11 +6209,7 @@
           <a:p>
             <a:r>
               <a:rPr lang="en-US" dirty="0"/>
-              <a:t>Simulations/ Proposed </a:t>
-            </a:r>
-            <a:r>
-              <a:rPr lang="en-US" dirty="0" smtClean="0"/>
-              <a:t>methods</a:t>
+              <a:t>Simulations/ Proposed methods</a:t>
             </a:r>
           </a:p>
           <a:p>
@@ -6224,7 +6217,6 @@
               <a:rPr lang="en-US" dirty="0"/>
               <a:t>Analysis for the results</a:t>
             </a:r>
-            <a:endParaRPr lang="en-US" dirty="0"/>
           </a:p>
         </p:txBody>
       </p:sp>
@@ -6274,10 +6266,9 @@
           <a:lstStyle/>
           <a:p>
             <a:r>
-              <a:rPr lang="en-US" dirty="0" smtClean="0"/>
+              <a:rPr lang="en-US" dirty="0"/>
               <a:t>Motivations</a:t>
             </a:r>
-            <a:endParaRPr lang="en-US" dirty="0"/>
           </a:p>
         </p:txBody>
       </p:sp>
@@ -6308,16 +6299,12 @@
               <a:buNone/>
             </a:pPr>
             <a:r>
-              <a:rPr lang="is-IS" dirty="0" smtClean="0"/>
+              <a:rPr lang="is-IS" dirty="0"/>
               <a:t>There are several </a:t>
             </a:r>
             <a:r>
               <a:rPr lang="en-US" dirty="0"/>
-              <a:t>n</a:t>
-            </a:r>
-            <a:r>
-              <a:rPr lang="en-US" dirty="0" smtClean="0"/>
-              <a:t>etwork anomaly detection tools that detect the anomalies  by observing inconsistent data from a given set of data.</a:t>
+              <a:t>network anomaly detection tools that detect the anomalies  by observing inconsistent data from a given set of data.</a:t>
             </a:r>
           </a:p>
           <a:p>
@@ -6331,7 +6318,7 @@
               <a:buNone/>
             </a:pPr>
             <a:r>
-              <a:rPr lang="en-US" dirty="0" smtClean="0"/>
+              <a:rPr lang="en-US" dirty="0"/>
               <a:t>Since, the network has a large amount of data to be processed, we decided to use MapReduce to detect anomalies in the network.</a:t>
             </a:r>
           </a:p>
@@ -6366,7 +6353,7 @@
               <a:defRPr/>
             </a:pPr>
             <a:r>
-              <a:rPr lang="en-US" dirty="0" smtClean="0"/>
+              <a:rPr lang="en-US" dirty="0"/>
               <a:t>MapReduce is a distributed programming model which can handle massive data concurrently in a large computer cluster. This makes it efficient to detect an anomaly in the network in real time. </a:t>
             </a:r>
           </a:p>
@@ -6388,7 +6375,7 @@
               <a:tabLst/>
               <a:defRPr/>
             </a:pPr>
-            <a:endParaRPr lang="en-US" dirty="0" smtClean="0"/>
+            <a:endParaRPr lang="en-US" dirty="0"/>
           </a:p>
           <a:p>
             <a:pPr marL="0" marR="0" lvl="0" indent="0" defTabSz="914400" eaLnBrk="1" fontAlgn="auto" latinLnBrk="0" hangingPunct="1">
@@ -6408,7 +6395,7 @@
               <a:tabLst/>
               <a:defRPr/>
             </a:pPr>
-            <a:endParaRPr lang="en-US" dirty="0" smtClean="0"/>
+            <a:endParaRPr lang="en-US" dirty="0"/>
           </a:p>
           <a:p>
             <a:pPr marL="0" marR="0" lvl="0" indent="0" defTabSz="914400" eaLnBrk="1" fontAlgn="auto" latinLnBrk="0" hangingPunct="1">
@@ -6428,7 +6415,7 @@
               <a:tabLst/>
               <a:defRPr/>
             </a:pPr>
-            <a:endParaRPr lang="en-US" dirty="0" smtClean="0"/>
+            <a:endParaRPr lang="en-US" dirty="0"/>
           </a:p>
           <a:p>
             <a:pPr marL="0" marR="0" lvl="0" indent="0" defTabSz="914400" eaLnBrk="1" fontAlgn="auto" latinLnBrk="0" hangingPunct="1">
@@ -6523,10 +6510,9 @@
           <a:lstStyle/>
           <a:p>
             <a:r>
-              <a:rPr lang="en-US" dirty="0" smtClean="0"/>
+              <a:rPr lang="en-US" dirty="0"/>
               <a:t>Related works and Novelty</a:t>
             </a:r>
-            <a:endParaRPr lang="en-US" dirty="0"/>
           </a:p>
         </p:txBody>
       </p:sp>
@@ -6680,33 +6666,33 @@
           <a:lstStyle/>
           <a:p>
             <a:r>
-              <a:rPr lang="en-US" dirty="0" smtClean="0"/>
+              <a:rPr lang="en-US" dirty="0"/>
               <a:t>We have a data set which contains details about each event which occurred in the network. Event details include user, event description, timestamp, location, IP address &amp; device. </a:t>
             </a:r>
           </a:p>
           <a:p>
             <a:r>
-              <a:rPr lang="en-US" dirty="0" smtClean="0"/>
+              <a:rPr lang="en-US" dirty="0"/>
               <a:t>Each anomaly is assigned a factor based on how much deviation it causes from the normal operation of the network.	</a:t>
             </a:r>
           </a:p>
           <a:p>
             <a:r>
-              <a:rPr lang="en-US" dirty="0" smtClean="0"/>
+              <a:rPr lang="en-US" dirty="0"/>
               <a:t>Anomalies in this case can be: </a:t>
             </a:r>
           </a:p>
           <a:p>
             <a:pPr lvl="1"/>
             <a:r>
-              <a:rPr lang="en-US" dirty="0" smtClean="0"/>
+              <a:rPr lang="en-US" dirty="0"/>
               <a:t>The event is arising from a VPN or a proxy.</a:t>
             </a:r>
           </a:p>
           <a:p>
             <a:pPr lvl="1"/>
             <a:r>
-              <a:rPr lang="en-US" dirty="0" smtClean="0"/>
+              <a:rPr lang="en-US" dirty="0"/>
               <a:t>The geo-location determined using the IP address is different from the location of the device.</a:t>
             </a:r>
           </a:p>
@@ -6731,10 +6717,9 @@
           <a:lstStyle/>
           <a:p>
             <a:r>
-              <a:rPr lang="en-US" dirty="0" smtClean="0"/>
+              <a:rPr lang="en-US" dirty="0"/>
               <a:t>Problem Description</a:t>
             </a:r>
-            <a:endParaRPr lang="en-US" dirty="0"/>
           </a:p>
         </p:txBody>
       </p:sp>
@@ -6784,10 +6769,9 @@
           <a:lstStyle/>
           <a:p>
             <a:r>
-              <a:rPr lang="en-US" dirty="0" smtClean="0"/>
+              <a:rPr lang="en-US" dirty="0"/>
               <a:t>Problem Description</a:t>
             </a:r>
-            <a:endParaRPr lang="en-US" dirty="0"/>
           </a:p>
         </p:txBody>
       </p:sp>
@@ -6822,37 +6806,28 @@
           <a:p>
             <a:pPr lvl="1"/>
             <a:r>
-              <a:rPr lang="mr-IN" dirty="0" smtClean="0"/>
+              <a:rPr lang="mr-IN" dirty="0"/>
               <a:t>…</a:t>
             </a:r>
-            <a:endParaRPr lang="en-US" dirty="0" smtClean="0"/>
-          </a:p>
-          <a:p>
-            <a:r>
-              <a:rPr lang="en-US" dirty="0" smtClean="0"/>
-              <a:t>The event’s </a:t>
-            </a:r>
+            <a:endParaRPr lang="en-US" dirty="0"/>
+          </a:p>
+          <a:p>
             <a:r>
               <a:rPr lang="en-US" dirty="0"/>
-              <a:t>anomaly is calculated using each anomaly’s factor which is present in the event</a:t>
-            </a:r>
-            <a:r>
-              <a:rPr lang="en-US" dirty="0" smtClean="0"/>
-              <a:t>.</a:t>
-            </a:r>
-          </a:p>
-          <a:p>
-            <a:r>
-              <a:rPr lang="en-US" dirty="0" smtClean="0"/>
+              <a:t>The event’s anomaly is calculated using each anomaly’s factor which is present in the event.</a:t>
+            </a:r>
+          </a:p>
+          <a:p>
+            <a:r>
+              <a:rPr lang="en-US" dirty="0"/>
               <a:t>If the events anomaly is greater than the threshold set by the administrator of the network, the event is red flagged.</a:t>
             </a:r>
           </a:p>
           <a:p>
             <a:r>
-              <a:rPr lang="en-US" dirty="0" smtClean="0"/>
+              <a:rPr lang="en-US" dirty="0"/>
               <a:t>The threshold varies based on the security levels required by the administrator. </a:t>
             </a:r>
-            <a:endParaRPr lang="en-US" dirty="0"/>
           </a:p>
           <a:p>
             <a:endParaRPr lang="en-US" dirty="0"/>
@@ -6905,10 +6880,9 @@
           <a:lstStyle/>
           <a:p>
             <a:r>
-              <a:rPr lang="en-US" dirty="0" smtClean="0"/>
+              <a:rPr lang="en-US" dirty="0"/>
               <a:t>Design/ Proposed methods</a:t>
             </a:r>
-            <a:endParaRPr lang="en-US" dirty="0"/>
           </a:p>
         </p:txBody>
       </p:sp>
@@ -6928,32 +6902,31 @@
           <a:lstStyle/>
           <a:p>
             <a:r>
-              <a:rPr lang="en-US" dirty="0" smtClean="0"/>
+              <a:rPr lang="en-US" dirty="0"/>
               <a:t>Detect whether the event has location spoofed</a:t>
             </a:r>
           </a:p>
           <a:p>
             <a:r>
-              <a:rPr lang="en-US" dirty="0" smtClean="0"/>
+              <a:rPr lang="en-US" dirty="0"/>
               <a:t>Map related events to each event</a:t>
             </a:r>
-            <a:endParaRPr lang="en-US" dirty="0"/>
-          </a:p>
-          <a:p>
-            <a:r>
-              <a:rPr lang="en-US" dirty="0" smtClean="0"/>
+          </a:p>
+          <a:p>
+            <a:r>
+              <a:rPr lang="en-US" dirty="0"/>
               <a:t>Using related events, build a user profile</a:t>
             </a:r>
           </a:p>
           <a:p>
             <a:r>
-              <a:rPr lang="en-US" dirty="0" smtClean="0"/>
+              <a:rPr lang="en-US" dirty="0"/>
               <a:t>Determine event’s anomaly based on how much it deviates from the user’s profile</a:t>
             </a:r>
           </a:p>
           <a:p>
             <a:r>
-              <a:rPr lang="en-US" dirty="0" smtClean="0"/>
+              <a:rPr lang="en-US" dirty="0"/>
               <a:t>Finally red flag it if its greater than the set anomaly threshold</a:t>
             </a:r>
           </a:p>
@@ -7005,10 +6978,9 @@
           <a:lstStyle/>
           <a:p>
             <a:r>
-              <a:rPr lang="en-US" dirty="0" smtClean="0"/>
+              <a:rPr lang="en-US" dirty="0"/>
               <a:t>Detect location spoofing</a:t>
             </a:r>
-            <a:endParaRPr lang="en-US" dirty="0"/>
           </a:p>
         </p:txBody>
       </p:sp>
@@ -7030,19 +7002,19 @@
           <a:lstStyle/>
           <a:p>
             <a:r>
-              <a:rPr lang="en-US" dirty="0" smtClean="0"/>
+              <a:rPr lang="en-US" dirty="0"/>
               <a:t>In Mapper stage, map every event using IP as the key</a:t>
             </a:r>
           </a:p>
           <a:p>
             <a:r>
-              <a:rPr lang="en-US" dirty="0" smtClean="0"/>
+              <a:rPr lang="en-US" dirty="0"/>
               <a:t>In Reducer stage, flag or not flag every event for location spoofing</a:t>
             </a:r>
           </a:p>
           <a:p>
             <a:r>
-              <a:rPr lang="en-US" dirty="0" smtClean="0"/>
+              <a:rPr lang="en-US" dirty="0"/>
               <a:t>Location spoofed if</a:t>
             </a:r>
           </a:p>
@@ -7050,41 +7022,21 @@
             <a:pPr lvl="1"/>
             <a:r>
               <a:rPr lang="en-US" dirty="0"/>
-              <a:t>T</a:t>
-            </a:r>
-            <a:r>
-              <a:rPr lang="en-US" dirty="0" smtClean="0"/>
-              <a:t>he users are greater than average household count for any given IP</a:t>
+              <a:t>The users are greater than average household count for any given IP</a:t>
             </a:r>
           </a:p>
           <a:p>
             <a:pPr lvl="1"/>
             <a:r>
               <a:rPr lang="en-US" dirty="0"/>
-              <a:t>T</a:t>
-            </a:r>
-            <a:r>
-              <a:rPr lang="en-US" dirty="0" smtClean="0"/>
-              <a:t>he </a:t>
-            </a:r>
+              <a:t>The IP location’s is different from the determined coarse</a:t>
+            </a:r>
+          </a:p>
+          <a:p>
+            <a:pPr lvl="2"/>
             <a:r>
               <a:rPr lang="en-US" dirty="0"/>
-              <a:t>IP location’s is different from the determined </a:t>
-            </a:r>
-            <a:r>
-              <a:rPr lang="en-US" dirty="0" smtClean="0"/>
-              <a:t>coarse</a:t>
-            </a:r>
-          </a:p>
-          <a:p>
-            <a:pPr lvl="2"/>
-            <a:r>
-              <a:rPr lang="en-US" dirty="0"/>
-              <a:t>C</a:t>
-            </a:r>
-            <a:r>
-              <a:rPr lang="en-US" dirty="0" smtClean="0"/>
-              <a:t>oarse location  for the given IP is determined based on the locations of all events</a:t>
+              <a:t>Coarse location  for the given IP is determined based on the locations of all events</a:t>
             </a:r>
           </a:p>
           <a:p>
@@ -7132,65 +7084,98 @@
             <p:ph type="title"/>
           </p:nvPr>
         </p:nvSpPr>
-        <p:spPr/>
+        <p:spPr>
+          <a:xfrm>
+            <a:off x="1510748" y="742122"/>
+            <a:ext cx="9992276" cy="1696277"/>
+          </a:xfrm>
+        </p:spPr>
         <p:txBody>
           <a:bodyPr/>
           <a:lstStyle/>
           <a:p>
             <a:r>
-              <a:rPr lang="en-US" dirty="0" smtClean="0"/>
+              <a:rPr lang="en-US" dirty="0"/>
               <a:t>User profiling and anomaly detection</a:t>
             </a:r>
+          </a:p>
+        </p:txBody>
+      </p:sp>
+      <p:sp>
+        <p:nvSpPr>
+          <p:cNvPr id="3" name="Content Placeholder 2"/>
+          <p:cNvSpPr>
+            <a:spLocks noGrp="1"/>
+          </p:cNvSpPr>
+          <p:nvPr>
+            <p:ph idx="1"/>
+          </p:nvPr>
+        </p:nvSpPr>
+        <p:spPr>
+          <a:xfrm>
+            <a:off x="1471058" y="2666999"/>
+            <a:ext cx="10018713" cy="3124201"/>
+          </a:xfrm>
+        </p:spPr>
+        <p:txBody>
+          <a:bodyPr/>
+          <a:lstStyle/>
+          <a:p>
+            <a:r>
+              <a:rPr lang="en-US" dirty="0"/>
+              <a:t>For every event, map all the previous events which belong to that user</a:t>
+            </a:r>
+          </a:p>
+          <a:p>
             <a:endParaRPr lang="en-US" dirty="0"/>
           </a:p>
-        </p:txBody>
-      </p:sp>
-      <p:sp>
-        <p:nvSpPr>
-          <p:cNvPr id="3" name="Content Placeholder 2"/>
-          <p:cNvSpPr>
-            <a:spLocks noGrp="1"/>
-          </p:cNvSpPr>
-          <p:nvPr>
-            <p:ph idx="1"/>
-          </p:nvPr>
-        </p:nvSpPr>
-        <p:spPr/>
-        <p:txBody>
-          <a:bodyPr/>
-          <a:lstStyle/>
-          <a:p>
-            <a:r>
-              <a:rPr lang="en-US" dirty="0" smtClean="0"/>
-              <a:t>For every event, map all the previous events which belong to that user</a:t>
-            </a:r>
-          </a:p>
           <a:p>
             <a:endParaRPr lang="en-US" dirty="0"/>
           </a:p>
           <a:p>
-            <a:endParaRPr lang="en-US" dirty="0" smtClean="0"/>
-          </a:p>
-          <a:p>
             <a:endParaRPr lang="en-US" dirty="0"/>
           </a:p>
           <a:p>
-            <a:endParaRPr lang="en-US" dirty="0" smtClean="0"/>
-          </a:p>
-          <a:p>
             <a:endParaRPr lang="en-US" dirty="0"/>
           </a:p>
           <a:p>
-            <a:endParaRPr lang="en-US" dirty="0" smtClean="0"/>
-          </a:p>
-          <a:p>
             <a:endParaRPr lang="en-US" dirty="0"/>
           </a:p>
           <a:p>
             <a:endParaRPr lang="en-US" dirty="0"/>
           </a:p>
-        </p:txBody>
-      </p:sp>
+          <a:p>
+            <a:endParaRPr lang="en-US" dirty="0"/>
+          </a:p>
+          <a:p>
+            <a:endParaRPr lang="en-US" dirty="0"/>
+          </a:p>
+        </p:txBody>
+      </p:sp>
+      <p:pic>
+        <p:nvPicPr>
+          <p:cNvPr id="5" name="Picture 4"/>
+          <p:cNvPicPr>
+            <a:picLocks noChangeAspect="1"/>
+          </p:cNvPicPr>
+          <p:nvPr/>
+        </p:nvPicPr>
+        <p:blipFill>
+          <a:blip r:embed="rId2"/>
+          <a:stretch>
+            <a:fillRect/>
+          </a:stretch>
+        </p:blipFill>
+        <p:spPr>
+          <a:xfrm>
+            <a:off x="2501525" y="2438399"/>
+            <a:ext cx="8245988" cy="4173479"/>
+          </a:xfrm>
+          <a:prstGeom prst="rect">
+            <a:avLst/>
+          </a:prstGeom>
+        </p:spPr>
+      </p:pic>
     </p:spTree>
     <p:extLst>
       <p:ext uri="{BB962C8B-B14F-4D97-AF65-F5344CB8AC3E}">
@@ -7261,51 +7246,42 @@
           <a:lstStyle/>
           <a:p>
             <a:r>
-              <a:rPr lang="en-US" dirty="0" smtClean="0"/>
+              <a:rPr lang="en-US" dirty="0"/>
               <a:t>Determine all the defined anomalies present in the event</a:t>
             </a:r>
           </a:p>
           <a:p>
             <a:r>
-              <a:rPr lang="en-US" dirty="0" smtClean="0"/>
+              <a:rPr lang="en-US" dirty="0"/>
               <a:t>Calculate the total anomaly factor for the event</a:t>
             </a:r>
           </a:p>
           <a:p>
             <a:pPr lvl="1"/>
             <a:r>
-              <a:rPr lang="en-US" dirty="0" smtClean="0"/>
+              <a:rPr lang="en-US" dirty="0"/>
               <a:t>Ex: If location spoofing is detected for the event, then anomaly factor is 0.35</a:t>
             </a:r>
           </a:p>
           <a:p>
             <a:pPr lvl="1"/>
             <a:r>
-              <a:rPr lang="en-US" dirty="0" smtClean="0"/>
+              <a:rPr lang="en-US" dirty="0"/>
               <a:t>If user had authentication failure as prior event, then anomaly factor is 0.40</a:t>
             </a:r>
           </a:p>
           <a:p>
             <a:pPr lvl="1"/>
             <a:r>
-              <a:rPr lang="en-US" dirty="0" smtClean="0"/>
-              <a:t>If even has both (location spoofing &amp; </a:t>
-            </a:r>
-            <a:r>
               <a:rPr lang="en-US" dirty="0"/>
-              <a:t>authentication </a:t>
-            </a:r>
-            <a:r>
-              <a:rPr lang="en-US" dirty="0" smtClean="0"/>
-              <a:t>failure), then anomaly factory is 0.75</a:t>
-            </a:r>
-          </a:p>
-          <a:p>
-            <a:r>
-              <a:rPr lang="en-US" dirty="0" smtClean="0"/>
+              <a:t>If even has both (location spoofing &amp; authentication failure), then anomaly factory is 0.75</a:t>
+            </a:r>
+          </a:p>
+          <a:p>
+            <a:r>
+              <a:rPr lang="en-US" dirty="0"/>
               <a:t>If calculated anomaly factor is greater than the threshold, flag the event for administrator’s review</a:t>
             </a:r>
-            <a:endParaRPr lang="en-US" dirty="0"/>
           </a:p>
         </p:txBody>
       </p:sp>

</xml_diff>